<commit_message>
First prez cool shit
</commit_message>
<xml_diff>
--- a/Presentations/Intermediaire/LFA_Baehler_Schowing_Intermédiaire.pptx
+++ b/Presentations/Intermediaire/LFA_Baehler_Schowing_Intermédiaire.pptx
@@ -4,6 +4,9 @@
   <p:sldMasterIdLst>
     <p:sldMasterId id="2147483660" r:id="rId1"/>
   </p:sldMasterIdLst>
+  <p:notesMasterIdLst>
+    <p:notesMasterId r:id="rId14"/>
+  </p:notesMasterIdLst>
   <p:sldIdLst>
     <p:sldId id="256" r:id="rId2"/>
     <p:sldId id="257" r:id="rId3"/>
@@ -14,6 +17,9 @@
     <p:sldId id="262" r:id="rId8"/>
     <p:sldId id="263" r:id="rId9"/>
     <p:sldId id="264" r:id="rId10"/>
+    <p:sldId id="265" r:id="rId11"/>
+    <p:sldId id="266" r:id="rId12"/>
+    <p:sldId id="267" r:id="rId13"/>
   </p:sldIdLst>
   <p:sldSz cx="12192000" cy="6858000"/>
   <p:notesSz cx="6858000" cy="9144000"/>
@@ -112,7 +118,452 @@
       </a:defRPr>
     </a:lvl9pPr>
   </p:defaultTextStyle>
+  <p:extLst>
+    <p:ext uri="{EFAFB233-063F-42B5-8137-9DF3F51BA10A}">
+      <p15:sldGuideLst xmlns:p15="http://schemas.microsoft.com/office/powerpoint/2012/main"/>
+    </p:ext>
+  </p:extLst>
 </p:presentation>
+</file>
+
+<file path=ppt/notesMasters/notesMaster1.xml><?xml version="1.0" encoding="utf-8"?>
+<p:notesMaster xmlns:a="http://schemas.openxmlformats.org/drawingml/2006/main" xmlns:r="http://schemas.openxmlformats.org/officeDocument/2006/relationships" xmlns:p="http://schemas.openxmlformats.org/presentationml/2006/main">
+  <p:cSld>
+    <p:bg>
+      <p:bgRef idx="1001">
+        <a:schemeClr val="bg1"/>
+      </p:bgRef>
+    </p:bg>
+    <p:spTree>
+      <p:nvGrpSpPr>
+        <p:cNvPr id="1" name=""/>
+        <p:cNvGrpSpPr/>
+        <p:nvPr/>
+      </p:nvGrpSpPr>
+      <p:grpSpPr>
+        <a:xfrm>
+          <a:off x="0" y="0"/>
+          <a:ext cx="0" cy="0"/>
+          <a:chOff x="0" y="0"/>
+          <a:chExt cx="0" cy="0"/>
+        </a:xfrm>
+      </p:grpSpPr>
+      <p:sp>
+        <p:nvSpPr>
+          <p:cNvPr id="2" name="Espace réservé de l'en-tête 1"/>
+          <p:cNvSpPr>
+            <a:spLocks noGrp="1"/>
+          </p:cNvSpPr>
+          <p:nvPr>
+            <p:ph type="hdr" sz="quarter"/>
+          </p:nvPr>
+        </p:nvSpPr>
+        <p:spPr>
+          <a:xfrm>
+            <a:off x="0" y="0"/>
+            <a:ext cx="2971800" cy="458788"/>
+          </a:xfrm>
+          <a:prstGeom prst="rect">
+            <a:avLst/>
+          </a:prstGeom>
+        </p:spPr>
+        <p:txBody>
+          <a:bodyPr vert="horz" lIns="91440" tIns="45720" rIns="91440" bIns="45720" rtlCol="0"/>
+          <a:lstStyle>
+            <a:lvl1pPr algn="l">
+              <a:defRPr sz="1200"/>
+            </a:lvl1pPr>
+          </a:lstStyle>
+          <a:p>
+            <a:endParaRPr lang="fr-CH"/>
+          </a:p>
+        </p:txBody>
+      </p:sp>
+      <p:sp>
+        <p:nvSpPr>
+          <p:cNvPr id="3" name="Espace réservé de la date 2"/>
+          <p:cNvSpPr>
+            <a:spLocks noGrp="1"/>
+          </p:cNvSpPr>
+          <p:nvPr>
+            <p:ph type="dt" idx="1"/>
+          </p:nvPr>
+        </p:nvSpPr>
+        <p:spPr>
+          <a:xfrm>
+            <a:off x="3884613" y="0"/>
+            <a:ext cx="2971800" cy="458788"/>
+          </a:xfrm>
+          <a:prstGeom prst="rect">
+            <a:avLst/>
+          </a:prstGeom>
+        </p:spPr>
+        <p:txBody>
+          <a:bodyPr vert="horz" lIns="91440" tIns="45720" rIns="91440" bIns="45720" rtlCol="0"/>
+          <a:lstStyle>
+            <a:lvl1pPr algn="r">
+              <a:defRPr sz="1200"/>
+            </a:lvl1pPr>
+          </a:lstStyle>
+          <a:p>
+            <a:fld id="{CCF0A8EB-6306-490E-A84A-CBE8765A7CC2}" type="datetimeFigureOut">
+              <a:rPr lang="fr-CH" smtClean="0"/>
+              <a:t>27.03.2017</a:t>
+            </a:fld>
+            <a:endParaRPr lang="fr-CH"/>
+          </a:p>
+        </p:txBody>
+      </p:sp>
+      <p:sp>
+        <p:nvSpPr>
+          <p:cNvPr id="4" name="Espace réservé de l'image des diapositives 3"/>
+          <p:cNvSpPr>
+            <a:spLocks noGrp="1" noRot="1" noChangeAspect="1"/>
+          </p:cNvSpPr>
+          <p:nvPr>
+            <p:ph type="sldImg" idx="2"/>
+          </p:nvPr>
+        </p:nvSpPr>
+        <p:spPr>
+          <a:xfrm>
+            <a:off x="685800" y="1143000"/>
+            <a:ext cx="5486400" cy="3086100"/>
+          </a:xfrm>
+          <a:prstGeom prst="rect">
+            <a:avLst/>
+          </a:prstGeom>
+          <a:noFill/>
+          <a:ln w="12700">
+            <a:solidFill>
+              <a:prstClr val="black"/>
+            </a:solidFill>
+          </a:ln>
+        </p:spPr>
+        <p:txBody>
+          <a:bodyPr vert="horz" lIns="91440" tIns="45720" rIns="91440" bIns="45720" rtlCol="0" anchor="ctr"/>
+          <a:lstStyle/>
+          <a:p>
+            <a:endParaRPr lang="fr-CH"/>
+          </a:p>
+        </p:txBody>
+      </p:sp>
+      <p:sp>
+        <p:nvSpPr>
+          <p:cNvPr id="5" name="Espace réservé des notes 4"/>
+          <p:cNvSpPr>
+            <a:spLocks noGrp="1"/>
+          </p:cNvSpPr>
+          <p:nvPr>
+            <p:ph type="body" sz="quarter" idx="3"/>
+          </p:nvPr>
+        </p:nvSpPr>
+        <p:spPr>
+          <a:xfrm>
+            <a:off x="685800" y="4400550"/>
+            <a:ext cx="5486400" cy="3600450"/>
+          </a:xfrm>
+          <a:prstGeom prst="rect">
+            <a:avLst/>
+          </a:prstGeom>
+        </p:spPr>
+        <p:txBody>
+          <a:bodyPr vert="horz" lIns="91440" tIns="45720" rIns="91440" bIns="45720" rtlCol="0"/>
+          <a:lstStyle/>
+          <a:p>
+            <a:pPr lvl="0"/>
+            <a:r>
+              <a:rPr lang="fr-FR"/>
+              <a:t>Modifier les styles du texte du masque</a:t>
+            </a:r>
+          </a:p>
+          <a:p>
+            <a:pPr lvl="1"/>
+            <a:r>
+              <a:rPr lang="fr-FR"/>
+              <a:t>Deuxième niveau</a:t>
+            </a:r>
+          </a:p>
+          <a:p>
+            <a:pPr lvl="2"/>
+            <a:r>
+              <a:rPr lang="fr-FR"/>
+              <a:t>Troisième niveau</a:t>
+            </a:r>
+          </a:p>
+          <a:p>
+            <a:pPr lvl="3"/>
+            <a:r>
+              <a:rPr lang="fr-FR"/>
+              <a:t>Quatrième niveau</a:t>
+            </a:r>
+          </a:p>
+          <a:p>
+            <a:pPr lvl="4"/>
+            <a:r>
+              <a:rPr lang="fr-FR"/>
+              <a:t>Cinquième niveau</a:t>
+            </a:r>
+            <a:endParaRPr lang="fr-CH"/>
+          </a:p>
+        </p:txBody>
+      </p:sp>
+      <p:sp>
+        <p:nvSpPr>
+          <p:cNvPr id="6" name="Espace réservé du pied de page 5"/>
+          <p:cNvSpPr>
+            <a:spLocks noGrp="1"/>
+          </p:cNvSpPr>
+          <p:nvPr>
+            <p:ph type="ftr" sz="quarter" idx="4"/>
+          </p:nvPr>
+        </p:nvSpPr>
+        <p:spPr>
+          <a:xfrm>
+            <a:off x="0" y="8685213"/>
+            <a:ext cx="2971800" cy="458787"/>
+          </a:xfrm>
+          <a:prstGeom prst="rect">
+            <a:avLst/>
+          </a:prstGeom>
+        </p:spPr>
+        <p:txBody>
+          <a:bodyPr vert="horz" lIns="91440" tIns="45720" rIns="91440" bIns="45720" rtlCol="0" anchor="b"/>
+          <a:lstStyle>
+            <a:lvl1pPr algn="l">
+              <a:defRPr sz="1200"/>
+            </a:lvl1pPr>
+          </a:lstStyle>
+          <a:p>
+            <a:endParaRPr lang="fr-CH"/>
+          </a:p>
+        </p:txBody>
+      </p:sp>
+      <p:sp>
+        <p:nvSpPr>
+          <p:cNvPr id="7" name="Espace réservé du numéro de diapositive 6"/>
+          <p:cNvSpPr>
+            <a:spLocks noGrp="1"/>
+          </p:cNvSpPr>
+          <p:nvPr>
+            <p:ph type="sldNum" sz="quarter" idx="5"/>
+          </p:nvPr>
+        </p:nvSpPr>
+        <p:spPr>
+          <a:xfrm>
+            <a:off x="3884613" y="8685213"/>
+            <a:ext cx="2971800" cy="458787"/>
+          </a:xfrm>
+          <a:prstGeom prst="rect">
+            <a:avLst/>
+          </a:prstGeom>
+        </p:spPr>
+        <p:txBody>
+          <a:bodyPr vert="horz" lIns="91440" tIns="45720" rIns="91440" bIns="45720" rtlCol="0" anchor="b"/>
+          <a:lstStyle>
+            <a:lvl1pPr algn="r">
+              <a:defRPr sz="1200"/>
+            </a:lvl1pPr>
+          </a:lstStyle>
+          <a:p>
+            <a:fld id="{4B55D7CE-579E-4C6A-A013-C86D1F7328A4}" type="slidenum">
+              <a:rPr lang="fr-CH" smtClean="0"/>
+              <a:t>‹N°›</a:t>
+            </a:fld>
+            <a:endParaRPr lang="fr-CH"/>
+          </a:p>
+        </p:txBody>
+      </p:sp>
+    </p:spTree>
+    <p:extLst>
+      <p:ext uri="{BB962C8B-B14F-4D97-AF65-F5344CB8AC3E}">
+        <p14:creationId xmlns:p14="http://schemas.microsoft.com/office/powerpoint/2010/main" val="1883073626"/>
+      </p:ext>
+    </p:extLst>
+  </p:cSld>
+  <p:clrMap bg1="lt1" tx1="dk1" bg2="lt2" tx2="dk2" accent1="accent1" accent2="accent2" accent3="accent3" accent4="accent4" accent5="accent5" accent6="accent6" hlink="hlink" folHlink="folHlink"/>
+  <p:notesStyle>
+    <a:lvl1pPr marL="0" algn="l" defTabSz="914400" rtl="0" eaLnBrk="1" latinLnBrk="0" hangingPunct="1">
+      <a:defRPr sz="1200" kern="1200">
+        <a:solidFill>
+          <a:schemeClr val="tx1"/>
+        </a:solidFill>
+        <a:latin typeface="+mn-lt"/>
+        <a:ea typeface="+mn-ea"/>
+        <a:cs typeface="+mn-cs"/>
+      </a:defRPr>
+    </a:lvl1pPr>
+    <a:lvl2pPr marL="457200" algn="l" defTabSz="914400" rtl="0" eaLnBrk="1" latinLnBrk="0" hangingPunct="1">
+      <a:defRPr sz="1200" kern="1200">
+        <a:solidFill>
+          <a:schemeClr val="tx1"/>
+        </a:solidFill>
+        <a:latin typeface="+mn-lt"/>
+        <a:ea typeface="+mn-ea"/>
+        <a:cs typeface="+mn-cs"/>
+      </a:defRPr>
+    </a:lvl2pPr>
+    <a:lvl3pPr marL="914400" algn="l" defTabSz="914400" rtl="0" eaLnBrk="1" latinLnBrk="0" hangingPunct="1">
+      <a:defRPr sz="1200" kern="1200">
+        <a:solidFill>
+          <a:schemeClr val="tx1"/>
+        </a:solidFill>
+        <a:latin typeface="+mn-lt"/>
+        <a:ea typeface="+mn-ea"/>
+        <a:cs typeface="+mn-cs"/>
+      </a:defRPr>
+    </a:lvl3pPr>
+    <a:lvl4pPr marL="1371600" algn="l" defTabSz="914400" rtl="0" eaLnBrk="1" latinLnBrk="0" hangingPunct="1">
+      <a:defRPr sz="1200" kern="1200">
+        <a:solidFill>
+          <a:schemeClr val="tx1"/>
+        </a:solidFill>
+        <a:latin typeface="+mn-lt"/>
+        <a:ea typeface="+mn-ea"/>
+        <a:cs typeface="+mn-cs"/>
+      </a:defRPr>
+    </a:lvl4pPr>
+    <a:lvl5pPr marL="1828800" algn="l" defTabSz="914400" rtl="0" eaLnBrk="1" latinLnBrk="0" hangingPunct="1">
+      <a:defRPr sz="1200" kern="1200">
+        <a:solidFill>
+          <a:schemeClr val="tx1"/>
+        </a:solidFill>
+        <a:latin typeface="+mn-lt"/>
+        <a:ea typeface="+mn-ea"/>
+        <a:cs typeface="+mn-cs"/>
+      </a:defRPr>
+    </a:lvl5pPr>
+    <a:lvl6pPr marL="2286000" algn="l" defTabSz="914400" rtl="0" eaLnBrk="1" latinLnBrk="0" hangingPunct="1">
+      <a:defRPr sz="1200" kern="1200">
+        <a:solidFill>
+          <a:schemeClr val="tx1"/>
+        </a:solidFill>
+        <a:latin typeface="+mn-lt"/>
+        <a:ea typeface="+mn-ea"/>
+        <a:cs typeface="+mn-cs"/>
+      </a:defRPr>
+    </a:lvl6pPr>
+    <a:lvl7pPr marL="2743200" algn="l" defTabSz="914400" rtl="0" eaLnBrk="1" latinLnBrk="0" hangingPunct="1">
+      <a:defRPr sz="1200" kern="1200">
+        <a:solidFill>
+          <a:schemeClr val="tx1"/>
+        </a:solidFill>
+        <a:latin typeface="+mn-lt"/>
+        <a:ea typeface="+mn-ea"/>
+        <a:cs typeface="+mn-cs"/>
+      </a:defRPr>
+    </a:lvl7pPr>
+    <a:lvl8pPr marL="3200400" algn="l" defTabSz="914400" rtl="0" eaLnBrk="1" latinLnBrk="0" hangingPunct="1">
+      <a:defRPr sz="1200" kern="1200">
+        <a:solidFill>
+          <a:schemeClr val="tx1"/>
+        </a:solidFill>
+        <a:latin typeface="+mn-lt"/>
+        <a:ea typeface="+mn-ea"/>
+        <a:cs typeface="+mn-cs"/>
+      </a:defRPr>
+    </a:lvl8pPr>
+    <a:lvl9pPr marL="3657600" algn="l" defTabSz="914400" rtl="0" eaLnBrk="1" latinLnBrk="0" hangingPunct="1">
+      <a:defRPr sz="1200" kern="1200">
+        <a:solidFill>
+          <a:schemeClr val="tx1"/>
+        </a:solidFill>
+        <a:latin typeface="+mn-lt"/>
+        <a:ea typeface="+mn-ea"/>
+        <a:cs typeface="+mn-cs"/>
+      </a:defRPr>
+    </a:lvl9pPr>
+  </p:notesStyle>
+</p:notesMaster>
+</file>
+
+<file path=ppt/notesSlides/notesSlide1.xml><?xml version="1.0" encoding="utf-8"?>
+<p:notes xmlns:a="http://schemas.openxmlformats.org/drawingml/2006/main" xmlns:r="http://schemas.openxmlformats.org/officeDocument/2006/relationships" xmlns:p="http://schemas.openxmlformats.org/presentationml/2006/main">
+  <p:cSld>
+    <p:spTree>
+      <p:nvGrpSpPr>
+        <p:cNvPr id="1" name=""/>
+        <p:cNvGrpSpPr/>
+        <p:nvPr/>
+      </p:nvGrpSpPr>
+      <p:grpSpPr>
+        <a:xfrm>
+          <a:off x="0" y="0"/>
+          <a:ext cx="0" cy="0"/>
+          <a:chOff x="0" y="0"/>
+          <a:chExt cx="0" cy="0"/>
+        </a:xfrm>
+      </p:grpSpPr>
+      <p:sp>
+        <p:nvSpPr>
+          <p:cNvPr id="2" name="Espace réservé de l'image des diapositives 1"/>
+          <p:cNvSpPr>
+            <a:spLocks noGrp="1" noRot="1" noChangeAspect="1"/>
+          </p:cNvSpPr>
+          <p:nvPr>
+            <p:ph type="sldImg"/>
+          </p:nvPr>
+        </p:nvSpPr>
+        <p:spPr/>
+      </p:sp>
+      <p:sp>
+        <p:nvSpPr>
+          <p:cNvPr id="3" name="Espace réservé des notes 2"/>
+          <p:cNvSpPr>
+            <a:spLocks noGrp="1"/>
+          </p:cNvSpPr>
+          <p:nvPr>
+            <p:ph type="body" idx="1"/>
+          </p:nvPr>
+        </p:nvSpPr>
+        <p:spPr/>
+        <p:txBody>
+          <a:bodyPr/>
+          <a:lstStyle/>
+          <a:p>
+            <a:r>
+              <a:rPr lang="fr-CH" dirty="0"/>
+              <a:t>https://fr.wikipedia.org/wiki/Inf%C3%A9rence_bay%C3%A9sienne</a:t>
+            </a:r>
+          </a:p>
+          <a:p>
+            <a:endParaRPr lang="fr-CH" dirty="0"/>
+          </a:p>
+        </p:txBody>
+      </p:sp>
+      <p:sp>
+        <p:nvSpPr>
+          <p:cNvPr id="4" name="Espace réservé du numéro de diapositive 3"/>
+          <p:cNvSpPr>
+            <a:spLocks noGrp="1"/>
+          </p:cNvSpPr>
+          <p:nvPr>
+            <p:ph type="sldNum" sz="quarter" idx="10"/>
+          </p:nvPr>
+        </p:nvSpPr>
+        <p:spPr/>
+        <p:txBody>
+          <a:bodyPr/>
+          <a:lstStyle/>
+          <a:p>
+            <a:fld id="{4B55D7CE-579E-4C6A-A013-C86D1F7328A4}" type="slidenum">
+              <a:rPr lang="fr-CH" smtClean="0"/>
+              <a:t>9</a:t>
+            </a:fld>
+            <a:endParaRPr lang="fr-CH"/>
+          </a:p>
+        </p:txBody>
+      </p:sp>
+    </p:spTree>
+    <p:extLst>
+      <p:ext uri="{BB962C8B-B14F-4D97-AF65-F5344CB8AC3E}">
+        <p14:creationId xmlns:p14="http://schemas.microsoft.com/office/powerpoint/2010/main" val="37960233"/>
+      </p:ext>
+    </p:extLst>
+  </p:cSld>
+  <p:clrMapOvr>
+    <a:masterClrMapping/>
+  </p:clrMapOvr>
+</p:notes>
 </file>
 
 <file path=ppt/slideLayouts/slideLayout1.xml><?xml version="1.0" encoding="utf-8"?>
@@ -5889,6 +6340,355 @@
 </p:sld>
 </file>
 
+<file path=ppt/slides/slide10.xml><?xml version="1.0" encoding="utf-8"?>
+<p:sld xmlns:a="http://schemas.openxmlformats.org/drawingml/2006/main" xmlns:r="http://schemas.openxmlformats.org/officeDocument/2006/relationships" xmlns:p="http://schemas.openxmlformats.org/presentationml/2006/main">
+  <p:cSld>
+    <p:spTree>
+      <p:nvGrpSpPr>
+        <p:cNvPr id="1" name=""/>
+        <p:cNvGrpSpPr/>
+        <p:nvPr/>
+      </p:nvGrpSpPr>
+      <p:grpSpPr>
+        <a:xfrm>
+          <a:off x="0" y="0"/>
+          <a:ext cx="0" cy="0"/>
+          <a:chOff x="0" y="0"/>
+          <a:chExt cx="0" cy="0"/>
+        </a:xfrm>
+      </p:grpSpPr>
+      <p:sp>
+        <p:nvSpPr>
+          <p:cNvPr id="2" name="Titre 1"/>
+          <p:cNvSpPr>
+            <a:spLocks noGrp="1"/>
+          </p:cNvSpPr>
+          <p:nvPr>
+            <p:ph type="title"/>
+          </p:nvPr>
+        </p:nvSpPr>
+        <p:spPr/>
+        <p:txBody>
+          <a:bodyPr/>
+          <a:lstStyle/>
+          <a:p>
+            <a:r>
+              <a:rPr lang="fr-CH" dirty="0"/>
+              <a:t>Analyse exploratoire</a:t>
+            </a:r>
+          </a:p>
+        </p:txBody>
+      </p:sp>
+      <p:pic>
+        <p:nvPicPr>
+          <p:cNvPr id="4" name="Image 3"/>
+          <p:cNvPicPr>
+            <a:picLocks noChangeAspect="1"/>
+          </p:cNvPicPr>
+          <p:nvPr/>
+        </p:nvPicPr>
+        <p:blipFill>
+          <a:blip r:embed="rId2"/>
+          <a:stretch>
+            <a:fillRect/>
+          </a:stretch>
+        </p:blipFill>
+        <p:spPr>
+          <a:xfrm>
+            <a:off x="1633817" y="2667636"/>
+            <a:ext cx="3778624" cy="2798275"/>
+          </a:xfrm>
+          <a:prstGeom prst="rect">
+            <a:avLst/>
+          </a:prstGeom>
+        </p:spPr>
+      </p:pic>
+      <p:pic>
+        <p:nvPicPr>
+          <p:cNvPr id="5" name="Image 4"/>
+          <p:cNvPicPr>
+            <a:picLocks noChangeAspect="1"/>
+          </p:cNvPicPr>
+          <p:nvPr/>
+        </p:nvPicPr>
+        <p:blipFill>
+          <a:blip r:embed="rId3"/>
+          <a:stretch>
+            <a:fillRect/>
+          </a:stretch>
+        </p:blipFill>
+        <p:spPr>
+          <a:xfrm>
+            <a:off x="5251977" y="2667636"/>
+            <a:ext cx="3774898" cy="2743661"/>
+          </a:xfrm>
+          <a:prstGeom prst="rect">
+            <a:avLst/>
+          </a:prstGeom>
+        </p:spPr>
+      </p:pic>
+      <p:sp>
+        <p:nvSpPr>
+          <p:cNvPr id="6" name="ZoneTexte 5"/>
+          <p:cNvSpPr txBox="1"/>
+          <p:nvPr/>
+        </p:nvSpPr>
+        <p:spPr>
+          <a:xfrm>
+            <a:off x="759759" y="1593476"/>
+            <a:ext cx="8680076" cy="369332"/>
+          </a:xfrm>
+          <a:prstGeom prst="rect">
+            <a:avLst/>
+          </a:prstGeom>
+          <a:noFill/>
+        </p:spPr>
+        <p:txBody>
+          <a:bodyPr wrap="square" rtlCol="0">
+            <a:spAutoFit/>
+          </a:bodyPr>
+          <a:lstStyle/>
+          <a:p>
+            <a:r>
+              <a:rPr lang="fr-CH" dirty="0"/>
+              <a:t>Pour le moment aucune corrélation n’est observable entre les stéroïdes et le BMI</a:t>
+            </a:r>
+          </a:p>
+        </p:txBody>
+      </p:sp>
+      <p:sp>
+        <p:nvSpPr>
+          <p:cNvPr id="7" name="ZoneTexte 6"/>
+          <p:cNvSpPr txBox="1"/>
+          <p:nvPr/>
+        </p:nvSpPr>
+        <p:spPr>
+          <a:xfrm>
+            <a:off x="3328147" y="5802406"/>
+            <a:ext cx="3765177" cy="658906"/>
+          </a:xfrm>
+          <a:prstGeom prst="rect">
+            <a:avLst/>
+          </a:prstGeom>
+          <a:noFill/>
+        </p:spPr>
+        <p:txBody>
+          <a:bodyPr wrap="square" rtlCol="0">
+            <a:spAutoFit/>
+          </a:bodyPr>
+          <a:lstStyle/>
+          <a:p>
+            <a:endParaRPr lang="fr-CH" dirty="0"/>
+          </a:p>
+        </p:txBody>
+      </p:sp>
+    </p:spTree>
+    <p:extLst>
+      <p:ext uri="{BB962C8B-B14F-4D97-AF65-F5344CB8AC3E}">
+        <p14:creationId xmlns:p14="http://schemas.microsoft.com/office/powerpoint/2010/main" val="4190707159"/>
+      </p:ext>
+    </p:extLst>
+  </p:cSld>
+  <p:clrMapOvr>
+    <a:masterClrMapping/>
+  </p:clrMapOvr>
+</p:sld>
+</file>
+
+<file path=ppt/slides/slide11.xml><?xml version="1.0" encoding="utf-8"?>
+<p:sld xmlns:a="http://schemas.openxmlformats.org/drawingml/2006/main" xmlns:r="http://schemas.openxmlformats.org/officeDocument/2006/relationships" xmlns:p="http://schemas.openxmlformats.org/presentationml/2006/main">
+  <p:cSld>
+    <p:spTree>
+      <p:nvGrpSpPr>
+        <p:cNvPr id="1" name=""/>
+        <p:cNvGrpSpPr/>
+        <p:nvPr/>
+      </p:nvGrpSpPr>
+      <p:grpSpPr>
+        <a:xfrm>
+          <a:off x="0" y="0"/>
+          <a:ext cx="0" cy="0"/>
+          <a:chOff x="0" y="0"/>
+          <a:chExt cx="0" cy="0"/>
+        </a:xfrm>
+      </p:grpSpPr>
+      <p:sp>
+        <p:nvSpPr>
+          <p:cNvPr id="2" name="Titre 1"/>
+          <p:cNvSpPr>
+            <a:spLocks noGrp="1"/>
+          </p:cNvSpPr>
+          <p:nvPr>
+            <p:ph type="title"/>
+          </p:nvPr>
+        </p:nvSpPr>
+        <p:spPr/>
+        <p:txBody>
+          <a:bodyPr/>
+          <a:lstStyle/>
+          <a:p>
+            <a:r>
+              <a:rPr lang="fr-CH" dirty="0"/>
+              <a:t>Conclusion</a:t>
+            </a:r>
+          </a:p>
+        </p:txBody>
+      </p:sp>
+      <p:sp>
+        <p:nvSpPr>
+          <p:cNvPr id="3" name="Espace réservé du contenu 2"/>
+          <p:cNvSpPr>
+            <a:spLocks noGrp="1"/>
+          </p:cNvSpPr>
+          <p:nvPr>
+            <p:ph idx="1"/>
+          </p:nvPr>
+        </p:nvSpPr>
+        <p:spPr/>
+        <p:txBody>
+          <a:bodyPr/>
+          <a:lstStyle/>
+          <a:p>
+            <a:r>
+              <a:rPr lang="fr-CH" dirty="0"/>
+              <a:t>Beaucoup de </a:t>
+            </a:r>
+            <a:r>
+              <a:rPr lang="fr-CH" dirty="0" err="1"/>
+              <a:t>preprocessing</a:t>
+            </a:r>
+            <a:r>
+              <a:rPr lang="fr-CH" dirty="0"/>
+              <a:t> à faire</a:t>
+            </a:r>
+          </a:p>
+          <a:p>
+            <a:endParaRPr lang="fr-CH" dirty="0"/>
+          </a:p>
+        </p:txBody>
+      </p:sp>
+    </p:spTree>
+    <p:extLst>
+      <p:ext uri="{BB962C8B-B14F-4D97-AF65-F5344CB8AC3E}">
+        <p14:creationId xmlns:p14="http://schemas.microsoft.com/office/powerpoint/2010/main" val="3625870678"/>
+      </p:ext>
+    </p:extLst>
+  </p:cSld>
+  <p:clrMapOvr>
+    <a:masterClrMapping/>
+  </p:clrMapOvr>
+</p:sld>
+</file>
+
+<file path=ppt/slides/slide12.xml><?xml version="1.0" encoding="utf-8"?>
+<p:sld xmlns:a="http://schemas.openxmlformats.org/drawingml/2006/main" xmlns:r="http://schemas.openxmlformats.org/officeDocument/2006/relationships" xmlns:p="http://schemas.openxmlformats.org/presentationml/2006/main">
+  <p:cSld>
+    <p:spTree>
+      <p:nvGrpSpPr>
+        <p:cNvPr id="1" name=""/>
+        <p:cNvGrpSpPr/>
+        <p:nvPr/>
+      </p:nvGrpSpPr>
+      <p:grpSpPr>
+        <a:xfrm>
+          <a:off x="0" y="0"/>
+          <a:ext cx="0" cy="0"/>
+          <a:chOff x="0" y="0"/>
+          <a:chExt cx="0" cy="0"/>
+        </a:xfrm>
+      </p:grpSpPr>
+      <p:sp>
+        <p:nvSpPr>
+          <p:cNvPr id="2" name="Titre 1"/>
+          <p:cNvSpPr>
+            <a:spLocks noGrp="1"/>
+          </p:cNvSpPr>
+          <p:nvPr>
+            <p:ph type="title"/>
+          </p:nvPr>
+        </p:nvSpPr>
+        <p:spPr/>
+        <p:txBody>
+          <a:bodyPr/>
+          <a:lstStyle/>
+          <a:p>
+            <a:endParaRPr lang="fr-CH"/>
+          </a:p>
+        </p:txBody>
+      </p:sp>
+      <p:sp>
+        <p:nvSpPr>
+          <p:cNvPr id="3" name="Espace réservé du contenu 2"/>
+          <p:cNvSpPr>
+            <a:spLocks noGrp="1"/>
+          </p:cNvSpPr>
+          <p:nvPr>
+            <p:ph idx="1"/>
+          </p:nvPr>
+        </p:nvSpPr>
+        <p:spPr/>
+        <p:txBody>
+          <a:bodyPr/>
+          <a:lstStyle/>
+          <a:p>
+            <a:endParaRPr lang="fr-CH"/>
+          </a:p>
+        </p:txBody>
+      </p:sp>
+      <p:pic>
+        <p:nvPicPr>
+          <p:cNvPr id="4098" name="Picture 2" descr="Résultat de recherche d'images pour &quot;to be continued&quot;"/>
+          <p:cNvPicPr>
+            <a:picLocks noChangeAspect="1" noChangeArrowheads="1"/>
+          </p:cNvPicPr>
+          <p:nvPr/>
+        </p:nvPicPr>
+        <p:blipFill>
+          <a:blip r:embed="rId2">
+            <a:extLst>
+              <a:ext uri="{28A0092B-C50C-407E-A947-70E740481C1C}">
+                <a14:useLocalDpi xmlns:a14="http://schemas.microsoft.com/office/drawing/2010/main" val="0"/>
+              </a:ext>
+            </a:extLst>
+          </a:blip>
+          <a:srcRect/>
+          <a:stretch>
+            <a:fillRect/>
+          </a:stretch>
+        </p:blipFill>
+        <p:spPr bwMode="auto">
+          <a:xfrm>
+            <a:off x="0" y="0"/>
+            <a:ext cx="12192000" cy="6858000"/>
+          </a:xfrm>
+          <a:prstGeom prst="rect">
+            <a:avLst/>
+          </a:prstGeom>
+          <a:noFill/>
+          <a:extLst>
+            <a:ext uri="{909E8E84-426E-40DD-AFC4-6F175D3DCCD1}">
+              <a14:hiddenFill xmlns:a14="http://schemas.microsoft.com/office/drawing/2010/main">
+                <a:solidFill>
+                  <a:srgbClr val="FFFFFF"/>
+                </a:solidFill>
+              </a14:hiddenFill>
+            </a:ext>
+          </a:extLst>
+        </p:spPr>
+      </p:pic>
+    </p:spTree>
+    <p:extLst>
+      <p:ext uri="{BB962C8B-B14F-4D97-AF65-F5344CB8AC3E}">
+        <p14:creationId xmlns:p14="http://schemas.microsoft.com/office/powerpoint/2010/main" val="1342143502"/>
+      </p:ext>
+    </p:extLst>
+  </p:cSld>
+  <p:clrMapOvr>
+    <a:masterClrMapping/>
+  </p:clrMapOvr>
+</p:sld>
+</file>
+
 <file path=ppt/slides/slide2.xml><?xml version="1.0" encoding="utf-8"?>
 <p:sld xmlns:a="http://schemas.openxmlformats.org/drawingml/2006/main" xmlns:r="http://schemas.openxmlformats.org/officeDocument/2006/relationships" xmlns:p="http://schemas.openxmlformats.org/presentationml/2006/main">
   <p:cSld>
@@ -6070,7 +6870,14 @@
             <a:pPr lvl="1"/>
             <a:r>
               <a:rPr lang="fr-CH" dirty="0"/>
-              <a:t>Appliquer la théorie de logique floue afin de créer un outil de prédiction</a:t>
+              <a:t>Analyser et comprendre des données</a:t>
+            </a:r>
+          </a:p>
+          <a:p>
+            <a:pPr lvl="1"/>
+            <a:r>
+              <a:rPr lang="fr-CH" dirty="0"/>
+              <a:t>Appliquer la logique floue afin de créer un outil de prédiction</a:t>
             </a:r>
           </a:p>
           <a:p>
@@ -6146,7 +6953,252 @@
           <a:bodyPr/>
           <a:lstStyle/>
           <a:p>
+            <a:r>
+              <a:rPr lang="fr-CH" dirty="0"/>
+              <a:t>Est-il possible de prédire l’IMC à partir des taux de différents stéroïdes présents dans le corps</a:t>
+            </a:r>
+          </a:p>
+          <a:p>
             <a:endParaRPr lang="fr-CH" dirty="0"/>
+          </a:p>
+          <a:p>
+            <a:endParaRPr lang="fr-CH" dirty="0"/>
+          </a:p>
+        </p:txBody>
+      </p:sp>
+      <p:pic>
+        <p:nvPicPr>
+          <p:cNvPr id="1030" name="Picture 6" descr="Résultat de recherche d'images pour &quot;manneken pis&quot;"/>
+          <p:cNvPicPr>
+            <a:picLocks noChangeAspect="1" noChangeArrowheads="1"/>
+          </p:cNvPicPr>
+          <p:nvPr/>
+        </p:nvPicPr>
+        <p:blipFill>
+          <a:blip r:embed="rId2">
+            <a:extLst>
+              <a:ext uri="{28A0092B-C50C-407E-A947-70E740481C1C}">
+                <a14:useLocalDpi xmlns:a14="http://schemas.microsoft.com/office/drawing/2010/main" val="0"/>
+              </a:ext>
+            </a:extLst>
+          </a:blip>
+          <a:srcRect/>
+          <a:stretch>
+            <a:fillRect/>
+          </a:stretch>
+        </p:blipFill>
+        <p:spPr bwMode="auto">
+          <a:xfrm>
+            <a:off x="921124" y="3277721"/>
+            <a:ext cx="1279712" cy="1919568"/>
+          </a:xfrm>
+          <a:prstGeom prst="rect">
+            <a:avLst/>
+          </a:prstGeom>
+          <a:noFill/>
+          <a:extLst>
+            <a:ext uri="{909E8E84-426E-40DD-AFC4-6F175D3DCCD1}">
+              <a14:hiddenFill xmlns:a14="http://schemas.microsoft.com/office/drawing/2010/main">
+                <a:solidFill>
+                  <a:srgbClr val="FFFFFF"/>
+                </a:solidFill>
+              </a14:hiddenFill>
+            </a:ext>
+          </a:extLst>
+        </p:spPr>
+      </p:pic>
+      <p:pic>
+        <p:nvPicPr>
+          <p:cNvPr id="1032" name="Picture 8" descr="Résultat de recherche d'images pour &quot;urine analysis&quot;"/>
+          <p:cNvPicPr>
+            <a:picLocks noChangeAspect="1" noChangeArrowheads="1"/>
+          </p:cNvPicPr>
+          <p:nvPr/>
+        </p:nvPicPr>
+        <p:blipFill>
+          <a:blip r:embed="rId3">
+            <a:extLst>
+              <a:ext uri="{28A0092B-C50C-407E-A947-70E740481C1C}">
+                <a14:useLocalDpi xmlns:a14="http://schemas.microsoft.com/office/drawing/2010/main" val="0"/>
+              </a:ext>
+            </a:extLst>
+          </a:blip>
+          <a:srcRect/>
+          <a:stretch>
+            <a:fillRect/>
+          </a:stretch>
+        </p:blipFill>
+        <p:spPr bwMode="auto">
+          <a:xfrm>
+            <a:off x="3548318" y="5084825"/>
+            <a:ext cx="2505075" cy="1672881"/>
+          </a:xfrm>
+          <a:prstGeom prst="rect">
+            <a:avLst/>
+          </a:prstGeom>
+          <a:noFill/>
+          <a:extLst>
+            <a:ext uri="{909E8E84-426E-40DD-AFC4-6F175D3DCCD1}">
+              <a14:hiddenFill xmlns:a14="http://schemas.microsoft.com/office/drawing/2010/main">
+                <a:solidFill>
+                  <a:srgbClr val="FFFFFF"/>
+                </a:solidFill>
+              </a14:hiddenFill>
+            </a:ext>
+          </a:extLst>
+        </p:spPr>
+      </p:pic>
+      <p:pic>
+        <p:nvPicPr>
+          <p:cNvPr id="1034" name="Picture 10" descr="Résultat de recherche d'images pour &quot;BMI&quot;"/>
+          <p:cNvPicPr>
+            <a:picLocks noChangeAspect="1" noChangeArrowheads="1"/>
+          </p:cNvPicPr>
+          <p:nvPr/>
+        </p:nvPicPr>
+        <p:blipFill>
+          <a:blip r:embed="rId4">
+            <a:extLst>
+              <a:ext uri="{28A0092B-C50C-407E-A947-70E740481C1C}">
+                <a14:useLocalDpi xmlns:a14="http://schemas.microsoft.com/office/drawing/2010/main" val="0"/>
+              </a:ext>
+            </a:extLst>
+          </a:blip>
+          <a:srcRect/>
+          <a:stretch>
+            <a:fillRect/>
+          </a:stretch>
+        </p:blipFill>
+        <p:spPr bwMode="auto">
+          <a:xfrm>
+            <a:off x="6716874" y="2863845"/>
+            <a:ext cx="2888323" cy="2042487"/>
+          </a:xfrm>
+          <a:prstGeom prst="rect">
+            <a:avLst/>
+          </a:prstGeom>
+          <a:noFill/>
+          <a:extLst>
+            <a:ext uri="{909E8E84-426E-40DD-AFC4-6F175D3DCCD1}">
+              <a14:hiddenFill xmlns:a14="http://schemas.microsoft.com/office/drawing/2010/main">
+                <a:solidFill>
+                  <a:srgbClr val="FFFFFF"/>
+                </a:solidFill>
+              </a14:hiddenFill>
+            </a:ext>
+          </a:extLst>
+        </p:spPr>
+      </p:pic>
+      <p:sp>
+        <p:nvSpPr>
+          <p:cNvPr id="4" name="Flèche : droite 3"/>
+          <p:cNvSpPr/>
+          <p:nvPr/>
+        </p:nvSpPr>
+        <p:spPr>
+          <a:xfrm rot="2366840">
+            <a:off x="2485695" y="4504764"/>
+            <a:ext cx="1290918" cy="571500"/>
+          </a:xfrm>
+          <a:prstGeom prst="rightArrow">
+            <a:avLst/>
+          </a:prstGeom>
+        </p:spPr>
+        <p:style>
+          <a:lnRef idx="2">
+            <a:schemeClr val="accent1">
+              <a:shade val="50000"/>
+            </a:schemeClr>
+          </a:lnRef>
+          <a:fillRef idx="1">
+            <a:schemeClr val="accent1"/>
+          </a:fillRef>
+          <a:effectRef idx="0">
+            <a:schemeClr val="accent1"/>
+          </a:effectRef>
+          <a:fontRef idx="minor">
+            <a:schemeClr val="lt1"/>
+          </a:fontRef>
+        </p:style>
+        <p:txBody>
+          <a:bodyPr rtlCol="0" anchor="ctr"/>
+          <a:lstStyle/>
+          <a:p>
+            <a:pPr algn="ctr"/>
+            <a:endParaRPr lang="fr-CH"/>
+          </a:p>
+        </p:txBody>
+      </p:sp>
+      <p:sp>
+        <p:nvSpPr>
+          <p:cNvPr id="10" name="Flèche : droite 9"/>
+          <p:cNvSpPr/>
+          <p:nvPr/>
+        </p:nvSpPr>
+        <p:spPr>
+          <a:xfrm rot="19024489">
+            <a:off x="5737643" y="4507729"/>
+            <a:ext cx="1290918" cy="571500"/>
+          </a:xfrm>
+          <a:prstGeom prst="rightArrow">
+            <a:avLst/>
+          </a:prstGeom>
+        </p:spPr>
+        <p:style>
+          <a:lnRef idx="2">
+            <a:schemeClr val="accent1">
+              <a:shade val="50000"/>
+            </a:schemeClr>
+          </a:lnRef>
+          <a:fillRef idx="1">
+            <a:schemeClr val="accent1"/>
+          </a:fillRef>
+          <a:effectRef idx="0">
+            <a:schemeClr val="accent1"/>
+          </a:effectRef>
+          <a:fontRef idx="minor">
+            <a:schemeClr val="lt1"/>
+          </a:fontRef>
+        </p:style>
+        <p:txBody>
+          <a:bodyPr rtlCol="0" anchor="ctr"/>
+          <a:lstStyle/>
+          <a:p>
+            <a:pPr algn="ctr"/>
+            <a:endParaRPr lang="fr-CH"/>
+          </a:p>
+        </p:txBody>
+      </p:sp>
+      <p:sp>
+        <p:nvSpPr>
+          <p:cNvPr id="5" name="ZoneTexte 4"/>
+          <p:cNvSpPr txBox="1"/>
+          <p:nvPr/>
+        </p:nvSpPr>
+        <p:spPr>
+          <a:xfrm>
+            <a:off x="4407152" y="3108589"/>
+            <a:ext cx="712695" cy="1446550"/>
+          </a:xfrm>
+          <a:prstGeom prst="rect">
+            <a:avLst/>
+          </a:prstGeom>
+          <a:noFill/>
+        </p:spPr>
+        <p:txBody>
+          <a:bodyPr wrap="square" rtlCol="0">
+            <a:spAutoFit/>
+          </a:bodyPr>
+          <a:lstStyle/>
+          <a:p>
+            <a:r>
+              <a:rPr lang="fr-CH" sz="8800" dirty="0">
+                <a:solidFill>
+                  <a:srgbClr val="92D050"/>
+                </a:solidFill>
+              </a:rPr>
+              <a:t>?</a:t>
+            </a:r>
           </a:p>
         </p:txBody>
       </p:sp>
@@ -6212,15 +7264,70 @@
             <p:ph idx="1"/>
           </p:nvPr>
         </p:nvSpPr>
-        <p:spPr/>
+        <p:spPr>
+          <a:xfrm>
+            <a:off x="677333" y="2160589"/>
+            <a:ext cx="9441579" cy="3880773"/>
+          </a:xfrm>
+        </p:spPr>
         <p:txBody>
           <a:bodyPr/>
           <a:lstStyle/>
           <a:p>
-            <a:endParaRPr lang="fr-CH"/>
-          </a:p>
-        </p:txBody>
-      </p:sp>
+            <a:r>
+              <a:rPr lang="fr-CH" dirty="0"/>
+              <a:t>Mesure permettant d’estimer la corpulence d’une personne</a:t>
+            </a:r>
+          </a:p>
+          <a:p>
+            <a:r>
+              <a:rPr lang="fr-CH" dirty="0"/>
+              <a:t>Constitue une indication, intervient dans le calcul de l’indice de masse grasse (IMG)</a:t>
+            </a:r>
+          </a:p>
+        </p:txBody>
+      </p:sp>
+      <p:pic>
+        <p:nvPicPr>
+          <p:cNvPr id="4" name="Picture 2" descr="Résultat de recherche d'images pour &quot;BMI&quot;"/>
+          <p:cNvPicPr>
+            <a:picLocks noChangeAspect="1" noChangeArrowheads="1"/>
+          </p:cNvPicPr>
+          <p:nvPr/>
+        </p:nvPicPr>
+        <p:blipFill>
+          <a:blip r:embed="rId2">
+            <a:extLst>
+              <a:ext uri="{28A0092B-C50C-407E-A947-70E740481C1C}">
+                <a14:useLocalDpi xmlns:a14="http://schemas.microsoft.com/office/drawing/2010/main" val="0"/>
+              </a:ext>
+            </a:extLst>
+          </a:blip>
+          <a:srcRect/>
+          <a:stretch>
+            <a:fillRect/>
+          </a:stretch>
+        </p:blipFill>
+        <p:spPr bwMode="auto">
+          <a:xfrm>
+            <a:off x="1051953" y="3159219"/>
+            <a:ext cx="6524625" cy="3457575"/>
+          </a:xfrm>
+          <a:prstGeom prst="rect">
+            <a:avLst/>
+          </a:prstGeom>
+          <a:noFill/>
+          <a:extLst>
+            <a:ext uri="{909E8E84-426E-40DD-AFC4-6F175D3DCCD1}">
+              <a14:hiddenFill xmlns:a14="http://schemas.microsoft.com/office/drawing/2010/main">
+                <a:solidFill>
+                  <a:srgbClr val="FFFFFF"/>
+                </a:solidFill>
+              </a14:hiddenFill>
+            </a:ext>
+          </a:extLst>
+        </p:spPr>
+      </p:pic>
     </p:spTree>
     <p:extLst>
       <p:ext uri="{BB962C8B-B14F-4D97-AF65-F5344CB8AC3E}">
@@ -6285,13 +7392,190 @@
         </p:nvSpPr>
         <p:spPr/>
         <p:txBody>
-          <a:bodyPr/>
-          <a:lstStyle/>
-          <a:p>
-            <a:endParaRPr lang="fr-CH"/>
-          </a:p>
-        </p:txBody>
-      </p:sp>
+          <a:bodyPr>
+            <a:normAutofit fontScale="92500" lnSpcReduction="20000"/>
+          </a:bodyPr>
+          <a:lstStyle/>
+          <a:p>
+            <a:r>
+              <a:rPr lang="fr-CH" dirty="0"/>
+              <a:t>Groupe de lipides</a:t>
+            </a:r>
+          </a:p>
+          <a:p>
+            <a:r>
+              <a:rPr lang="fr-CH" dirty="0"/>
+              <a:t>Dérivé des </a:t>
+            </a:r>
+            <a:r>
+              <a:rPr lang="fr-CH" dirty="0" err="1"/>
+              <a:t>triterpénoïdes</a:t>
+            </a:r>
+            <a:r>
+              <a:rPr lang="fr-CH" dirty="0"/>
+              <a:t> (lipides à 30 atomes de carbones)</a:t>
+            </a:r>
+          </a:p>
+          <a:p>
+            <a:r>
+              <a:rPr lang="fr-CH" dirty="0"/>
+              <a:t>Noyau </a:t>
+            </a:r>
+            <a:r>
+              <a:rPr lang="fr-CH" dirty="0" err="1"/>
+              <a:t>cyclopentanophénanthrénique</a:t>
+            </a:r>
+            <a:endParaRPr lang="fr-CH" dirty="0"/>
+          </a:p>
+          <a:p>
+            <a:pPr lvl="1"/>
+            <a:r>
+              <a:rPr lang="fr-CH" dirty="0"/>
+              <a:t>Constitué par trois cycles hexagonaux</a:t>
+            </a:r>
+          </a:p>
+          <a:p>
+            <a:pPr lvl="1"/>
+            <a:r>
+              <a:rPr lang="fr-CH" dirty="0"/>
+              <a:t>un cycle pentagonal</a:t>
+            </a:r>
+          </a:p>
+          <a:p>
+            <a:r>
+              <a:rPr lang="fr-CH" dirty="0"/>
+              <a:t>Médecine - Hormones stéroïdiennes</a:t>
+            </a:r>
+          </a:p>
+          <a:p>
+            <a:pPr lvl="1"/>
+            <a:r>
+              <a:rPr lang="fr-CH" dirty="0"/>
+              <a:t>Androgène</a:t>
+            </a:r>
+          </a:p>
+          <a:p>
+            <a:pPr lvl="1"/>
+            <a:r>
+              <a:rPr lang="fr-CH" dirty="0"/>
+              <a:t>Œstrogène</a:t>
+            </a:r>
+          </a:p>
+          <a:p>
+            <a:r>
+              <a:rPr lang="fr-CH" dirty="0"/>
+              <a:t>Sport - Stéroïdes anabolisants</a:t>
+            </a:r>
+          </a:p>
+          <a:p>
+            <a:pPr lvl="1"/>
+            <a:r>
+              <a:rPr lang="fr-CH" dirty="0"/>
+              <a:t>Augmentent la synthèse des protéines</a:t>
+            </a:r>
+          </a:p>
+          <a:p>
+            <a:pPr lvl="1"/>
+            <a:r>
+              <a:rPr lang="fr-CH" dirty="0"/>
+              <a:t>Entraînant une augmentation de tissus cellulaires</a:t>
+            </a:r>
+          </a:p>
+          <a:p>
+            <a:pPr lvl="1"/>
+            <a:r>
+              <a:rPr lang="fr-CH" dirty="0" err="1"/>
+              <a:t>Developpement</a:t>
+            </a:r>
+            <a:r>
+              <a:rPr lang="fr-CH" dirty="0"/>
+              <a:t> des cordes vocales et de la pilosité</a:t>
+            </a:r>
+          </a:p>
+        </p:txBody>
+      </p:sp>
+      <p:pic>
+        <p:nvPicPr>
+          <p:cNvPr id="2050" name="Picture 2" descr="Ball-and-stick diagram of the same steroid"/>
+          <p:cNvPicPr>
+            <a:picLocks noChangeAspect="1" noChangeArrowheads="1"/>
+          </p:cNvPicPr>
+          <p:nvPr/>
+        </p:nvPicPr>
+        <p:blipFill>
+          <a:blip r:embed="rId2">
+            <a:extLst>
+              <a:ext uri="{28A0092B-C50C-407E-A947-70E740481C1C}">
+                <a14:useLocalDpi xmlns:a14="http://schemas.microsoft.com/office/drawing/2010/main" val="0"/>
+              </a:ext>
+            </a:extLst>
+          </a:blip>
+          <a:srcRect/>
+          <a:stretch>
+            <a:fillRect/>
+          </a:stretch>
+        </p:blipFill>
+        <p:spPr bwMode="auto">
+          <a:xfrm>
+            <a:off x="9890312" y="82918"/>
+            <a:ext cx="2187203" cy="1490098"/>
+          </a:xfrm>
+          <a:prstGeom prst="rect">
+            <a:avLst/>
+          </a:prstGeom>
+          <a:noFill/>
+          <a:extLst>
+            <a:ext uri="{909E8E84-426E-40DD-AFC4-6F175D3DCCD1}">
+              <a14:hiddenFill xmlns:a14="http://schemas.microsoft.com/office/drawing/2010/main">
+                <a:solidFill>
+                  <a:srgbClr val="FFFFFF"/>
+                </a:solidFill>
+              </a14:hiddenFill>
+            </a:ext>
+          </a:extLst>
+        </p:spPr>
+      </p:pic>
+      <p:pic>
+        <p:nvPicPr>
+          <p:cNvPr id="2052" name="Picture 4" descr="https://upload.wikimedia.org/wikipedia/commons/d/df/Trimethyl_steroid-nomenclature.png"/>
+          <p:cNvPicPr>
+            <a:picLocks noChangeAspect="1" noChangeArrowheads="1"/>
+          </p:cNvPicPr>
+          <p:nvPr/>
+        </p:nvPicPr>
+        <p:blipFill>
+          <a:blip r:embed="rId3">
+            <a:extLst>
+              <a:ext uri="{28A0092B-C50C-407E-A947-70E740481C1C}">
+                <a14:useLocalDpi xmlns:a14="http://schemas.microsoft.com/office/drawing/2010/main" val="0"/>
+              </a:ext>
+            </a:extLst>
+          </a:blip>
+          <a:srcRect/>
+          <a:stretch>
+            <a:fillRect/>
+          </a:stretch>
+        </p:blipFill>
+        <p:spPr bwMode="auto">
+          <a:xfrm>
+            <a:off x="6388634" y="2931921"/>
+            <a:ext cx="3228814" cy="2338107"/>
+          </a:xfrm>
+          <a:prstGeom prst="rect">
+            <a:avLst/>
+          </a:prstGeom>
+          <a:noFill/>
+          <a:extLst>
+            <a:ext uri="{909E8E84-426E-40DD-AFC4-6F175D3DCCD1}">
+              <a14:hiddenFill xmlns:a14="http://schemas.microsoft.com/office/drawing/2010/main">
+                <a:solidFill>
+                  <a:srgbClr val="FFFFFF"/>
+                </a:solidFill>
+              </a14:hiddenFill>
+            </a:ext>
+          </a:extLst>
+        </p:spPr>
+      </p:pic>
     </p:spTree>
     <p:extLst>
       <p:ext uri="{BB962C8B-B14F-4D97-AF65-F5344CB8AC3E}">
@@ -6359,7 +7643,22 @@
           <a:bodyPr/>
           <a:lstStyle/>
           <a:p>
-            <a:endParaRPr lang="fr-CH"/>
+            <a:r>
+              <a:rPr lang="fr-CH" dirty="0"/>
+              <a:t>SKIPOGH</a:t>
+            </a:r>
+          </a:p>
+          <a:p>
+            <a:endParaRPr lang="fr-CH" dirty="0"/>
+          </a:p>
+          <a:p>
+            <a:r>
+              <a:rPr lang="fr-CH" dirty="0"/>
+              <a:t>Comment sont prélevées les données</a:t>
+            </a:r>
+          </a:p>
+          <a:p>
+            <a:endParaRPr lang="fr-CH" dirty="0"/>
           </a:p>
         </p:txBody>
       </p:sp>
@@ -6425,15 +7724,61 @@
             <p:ph idx="1"/>
           </p:nvPr>
         </p:nvSpPr>
-        <p:spPr/>
+        <p:spPr>
+          <a:xfrm>
+            <a:off x="2956610" y="2259106"/>
+            <a:ext cx="8596668" cy="3880773"/>
+          </a:xfrm>
+        </p:spPr>
         <p:txBody>
           <a:bodyPr/>
           <a:lstStyle/>
           <a:p>
-            <a:endParaRPr lang="fr-CH"/>
-          </a:p>
-        </p:txBody>
-      </p:sp>
+            <a:r>
+              <a:rPr lang="fr-CH" dirty="0"/>
+              <a:t>Deux sets:</a:t>
+            </a:r>
+          </a:p>
+          <a:p>
+            <a:pPr lvl="1"/>
+            <a:r>
+              <a:rPr lang="fr-CH" dirty="0"/>
+              <a:t>Participants et stéroïdes (~1129 participants VS 40 stéroïdes)</a:t>
+            </a:r>
+          </a:p>
+          <a:p>
+            <a:pPr lvl="1"/>
+            <a:r>
+              <a:rPr lang="fr-CH" dirty="0"/>
+              <a:t>Participants et informations diverses (tour de taille, sexe, etc…) </a:t>
+            </a:r>
+          </a:p>
+        </p:txBody>
+      </p:sp>
+      <p:pic>
+        <p:nvPicPr>
+          <p:cNvPr id="7" name="Image 6"/>
+          <p:cNvPicPr>
+            <a:picLocks noChangeAspect="1"/>
+          </p:cNvPicPr>
+          <p:nvPr/>
+        </p:nvPicPr>
+        <p:blipFill>
+          <a:blip r:embed="rId2"/>
+          <a:stretch>
+            <a:fillRect/>
+          </a:stretch>
+        </p:blipFill>
+        <p:spPr>
+          <a:xfrm>
+            <a:off x="519052" y="2259106"/>
+            <a:ext cx="2293282" cy="4598894"/>
+          </a:xfrm>
+          <a:prstGeom prst="rect">
+            <a:avLst/>
+          </a:prstGeom>
+        </p:spPr>
+      </p:pic>
     </p:spTree>
     <p:extLst>
       <p:ext uri="{BB962C8B-B14F-4D97-AF65-F5344CB8AC3E}">
@@ -6501,7 +7846,52 @@
           <a:bodyPr/>
           <a:lstStyle/>
           <a:p>
-            <a:endParaRPr lang="fr-CH"/>
+            <a:r>
+              <a:rPr lang="fr-CH" dirty="0"/>
+              <a:t>Prétraitement des données</a:t>
+            </a:r>
+          </a:p>
+          <a:p>
+            <a:pPr lvl="1"/>
+            <a:r>
+              <a:rPr lang="fr-CH" dirty="0"/>
+              <a:t>Élimination des participants sans données ou avec trop de données manquantes</a:t>
+            </a:r>
+          </a:p>
+          <a:p>
+            <a:pPr lvl="1"/>
+            <a:r>
+              <a:rPr lang="fr-CH" dirty="0"/>
+              <a:t>Gérer les données manquantes: algorithmes de datamining (</a:t>
+            </a:r>
+            <a:r>
+              <a:rPr lang="fr-CH" dirty="0" err="1"/>
+              <a:t>kNN</a:t>
+            </a:r>
+            <a:r>
+              <a:rPr lang="fr-CH" dirty="0"/>
+              <a:t>, inférence bayésienne,…)</a:t>
+            </a:r>
+          </a:p>
+          <a:p>
+            <a:r>
+              <a:rPr lang="fr-CH" dirty="0"/>
+              <a:t>Analyse des corrélations</a:t>
+            </a:r>
+          </a:p>
+          <a:p>
+            <a:pPr lvl="1"/>
+            <a:r>
+              <a:rPr lang="fr-CH" dirty="0"/>
+              <a:t>Les taux de stéroïdes sont-ils liés au BMI ?</a:t>
+            </a:r>
+          </a:p>
+          <a:p>
+            <a:pPr lvl="1"/>
+            <a:r>
+              <a:rPr lang="fr-CH" dirty="0"/>
+              <a:t>D’autres données sont-elles liées ?</a:t>
+            </a:r>
           </a:p>
         </p:txBody>
       </p:sp>
@@ -6773,4 +8163,299 @@
     </a:ext>
   </a:extLst>
 </a:theme>
+</file>
+
+<file path=ppt/theme/theme2.xml><?xml version="1.0" encoding="utf-8"?>
+<a:theme xmlns:a="http://schemas.openxmlformats.org/drawingml/2006/main" name="Thème Office">
+  <a:themeElements>
+    <a:clrScheme name="Office">
+      <a:dk1>
+        <a:sysClr val="windowText" lastClr="000000"/>
+      </a:dk1>
+      <a:lt1>
+        <a:sysClr val="window" lastClr="FFFFFF"/>
+      </a:lt1>
+      <a:dk2>
+        <a:srgbClr val="44546A"/>
+      </a:dk2>
+      <a:lt2>
+        <a:srgbClr val="E7E6E6"/>
+      </a:lt2>
+      <a:accent1>
+        <a:srgbClr val="4472C4"/>
+      </a:accent1>
+      <a:accent2>
+        <a:srgbClr val="ED7D31"/>
+      </a:accent2>
+      <a:accent3>
+        <a:srgbClr val="A5A5A5"/>
+      </a:accent3>
+      <a:accent4>
+        <a:srgbClr val="FFC000"/>
+      </a:accent4>
+      <a:accent5>
+        <a:srgbClr val="5B9BD5"/>
+      </a:accent5>
+      <a:accent6>
+        <a:srgbClr val="70AD47"/>
+      </a:accent6>
+      <a:hlink>
+        <a:srgbClr val="0563C1"/>
+      </a:hlink>
+      <a:folHlink>
+        <a:srgbClr val="954F72"/>
+      </a:folHlink>
+    </a:clrScheme>
+    <a:fontScheme name="Office">
+      <a:majorFont>
+        <a:latin typeface="Calibri Light" panose="020F0302020204030204"/>
+        <a:ea typeface=""/>
+        <a:cs typeface=""/>
+        <a:font script="Jpan" typeface="游ゴシック Light"/>
+        <a:font script="Hang" typeface="맑은 고딕"/>
+        <a:font script="Hans" typeface="等线 Light"/>
+        <a:font script="Hant" typeface="新細明體"/>
+        <a:font script="Arab" typeface="Times New Roman"/>
+        <a:font script="Hebr" typeface="Times New Roman"/>
+        <a:font script="Thai" typeface="Angsana New"/>
+        <a:font script="Ethi" typeface="Nyala"/>
+        <a:font script="Beng" typeface="Vrinda"/>
+        <a:font script="Gujr" typeface="Shruti"/>
+        <a:font script="Khmr" typeface="MoolBoran"/>
+        <a:font script="Knda" typeface="Tunga"/>
+        <a:font script="Guru" typeface="Raavi"/>
+        <a:font script="Cans" typeface="Euphemia"/>
+        <a:font script="Cher" typeface="Plantagenet Cherokee"/>
+        <a:font script="Yiii" typeface="Microsoft Yi Baiti"/>
+        <a:font script="Tibt" typeface="Microsoft Himalaya"/>
+        <a:font script="Thaa" typeface="MV Boli"/>
+        <a:font script="Deva" typeface="Mangal"/>
+        <a:font script="Telu" typeface="Gautami"/>
+        <a:font script="Taml" typeface="Latha"/>
+        <a:font script="Syrc" typeface="Estrangelo Edessa"/>
+        <a:font script="Orya" typeface="Kalinga"/>
+        <a:font script="Mlym" typeface="Kartika"/>
+        <a:font script="Laoo" typeface="DokChampa"/>
+        <a:font script="Sinh" typeface="Iskoola Pota"/>
+        <a:font script="Mong" typeface="Mongolian Baiti"/>
+        <a:font script="Viet" typeface="Times New Roman"/>
+        <a:font script="Uigh" typeface="Microsoft Uighur"/>
+        <a:font script="Geor" typeface="Sylfaen"/>
+        <a:font script="Armn" typeface="Arial"/>
+        <a:font script="Bugi" typeface="Leelawadee UI"/>
+        <a:font script="Bopo" typeface="Microsoft JhengHei"/>
+        <a:font script="Java" typeface="Javanese Text"/>
+        <a:font script="Lisu" typeface="Segoe UI"/>
+        <a:font script="Mymr" typeface="Myanmar Text"/>
+        <a:font script="Nkoo" typeface="Ebrima"/>
+        <a:font script="Olck" typeface="Nirmala UI"/>
+        <a:font script="Osma" typeface="Ebrima"/>
+        <a:font script="Phag" typeface="Phagspa"/>
+        <a:font script="Syrn" typeface="Estrangelo Edessa"/>
+        <a:font script="Syrj" typeface="Estrangelo Edessa"/>
+        <a:font script="Syre" typeface="Estrangelo Edessa"/>
+        <a:font script="Sora" typeface="Nirmala UI"/>
+        <a:font script="Tale" typeface="Microsoft Tai Le"/>
+        <a:font script="Talu" typeface="Microsoft New Tai Lue"/>
+        <a:font script="Tfng" typeface="Ebrima"/>
+      </a:majorFont>
+      <a:minorFont>
+        <a:latin typeface="Calibri" panose="020F0502020204030204"/>
+        <a:ea typeface=""/>
+        <a:cs typeface=""/>
+        <a:font script="Jpan" typeface="游ゴシック"/>
+        <a:font script="Hang" typeface="맑은 고딕"/>
+        <a:font script="Hans" typeface="等线"/>
+        <a:font script="Hant" typeface="新細明體"/>
+        <a:font script="Arab" typeface="Arial"/>
+        <a:font script="Hebr" typeface="Arial"/>
+        <a:font script="Thai" typeface="Cordia New"/>
+        <a:font script="Ethi" typeface="Nyala"/>
+        <a:font script="Beng" typeface="Vrinda"/>
+        <a:font script="Gujr" typeface="Shruti"/>
+        <a:font script="Khmr" typeface="DaunPenh"/>
+        <a:font script="Knda" typeface="Tunga"/>
+        <a:font script="Guru" typeface="Raavi"/>
+        <a:font script="Cans" typeface="Euphemia"/>
+        <a:font script="Cher" typeface="Plantagenet Cherokee"/>
+        <a:font script="Yiii" typeface="Microsoft Yi Baiti"/>
+        <a:font script="Tibt" typeface="Microsoft Himalaya"/>
+        <a:font script="Thaa" typeface="MV Boli"/>
+        <a:font script="Deva" typeface="Mangal"/>
+        <a:font script="Telu" typeface="Gautami"/>
+        <a:font script="Taml" typeface="Latha"/>
+        <a:font script="Syrc" typeface="Estrangelo Edessa"/>
+        <a:font script="Orya" typeface="Kalinga"/>
+        <a:font script="Mlym" typeface="Kartika"/>
+        <a:font script="Laoo" typeface="DokChampa"/>
+        <a:font script="Sinh" typeface="Iskoola Pota"/>
+        <a:font script="Mong" typeface="Mongolian Baiti"/>
+        <a:font script="Viet" typeface="Arial"/>
+        <a:font script="Uigh" typeface="Microsoft Uighur"/>
+        <a:font script="Geor" typeface="Sylfaen"/>
+        <a:font script="Armn" typeface="Arial"/>
+        <a:font script="Bugi" typeface="Leelawadee UI"/>
+        <a:font script="Bopo" typeface="Microsoft JhengHei"/>
+        <a:font script="Java" typeface="Javanese Text"/>
+        <a:font script="Lisu" typeface="Segoe UI"/>
+        <a:font script="Mymr" typeface="Myanmar Text"/>
+        <a:font script="Nkoo" typeface="Ebrima"/>
+        <a:font script="Olck" typeface="Nirmala UI"/>
+        <a:font script="Osma" typeface="Ebrima"/>
+        <a:font script="Phag" typeface="Phagspa"/>
+        <a:font script="Syrn" typeface="Estrangelo Edessa"/>
+        <a:font script="Syrj" typeface="Estrangelo Edessa"/>
+        <a:font script="Syre" typeface="Estrangelo Edessa"/>
+        <a:font script="Sora" typeface="Nirmala UI"/>
+        <a:font script="Tale" typeface="Microsoft Tai Le"/>
+        <a:font script="Talu" typeface="Microsoft New Tai Lue"/>
+        <a:font script="Tfng" typeface="Ebrima"/>
+      </a:minorFont>
+    </a:fontScheme>
+    <a:fmtScheme name="Office">
+      <a:fillStyleLst>
+        <a:solidFill>
+          <a:schemeClr val="phClr"/>
+        </a:solidFill>
+        <a:gradFill rotWithShape="1">
+          <a:gsLst>
+            <a:gs pos="0">
+              <a:schemeClr val="phClr">
+                <a:lumMod val="110000"/>
+                <a:satMod val="105000"/>
+                <a:tint val="67000"/>
+              </a:schemeClr>
+            </a:gs>
+            <a:gs pos="50000">
+              <a:schemeClr val="phClr">
+                <a:lumMod val="105000"/>
+                <a:satMod val="103000"/>
+                <a:tint val="73000"/>
+              </a:schemeClr>
+            </a:gs>
+            <a:gs pos="100000">
+              <a:schemeClr val="phClr">
+                <a:lumMod val="105000"/>
+                <a:satMod val="109000"/>
+                <a:tint val="81000"/>
+              </a:schemeClr>
+            </a:gs>
+          </a:gsLst>
+          <a:lin ang="5400000" scaled="0"/>
+        </a:gradFill>
+        <a:gradFill rotWithShape="1">
+          <a:gsLst>
+            <a:gs pos="0">
+              <a:schemeClr val="phClr">
+                <a:satMod val="103000"/>
+                <a:lumMod val="102000"/>
+                <a:tint val="94000"/>
+              </a:schemeClr>
+            </a:gs>
+            <a:gs pos="50000">
+              <a:schemeClr val="phClr">
+                <a:satMod val="110000"/>
+                <a:lumMod val="100000"/>
+                <a:shade val="100000"/>
+              </a:schemeClr>
+            </a:gs>
+            <a:gs pos="100000">
+              <a:schemeClr val="phClr">
+                <a:lumMod val="99000"/>
+                <a:satMod val="120000"/>
+                <a:shade val="78000"/>
+              </a:schemeClr>
+            </a:gs>
+          </a:gsLst>
+          <a:lin ang="5400000" scaled="0"/>
+        </a:gradFill>
+      </a:fillStyleLst>
+      <a:lnStyleLst>
+        <a:ln w="6350" cap="flat" cmpd="sng" algn="ctr">
+          <a:solidFill>
+            <a:schemeClr val="phClr"/>
+          </a:solidFill>
+          <a:prstDash val="solid"/>
+          <a:miter lim="800000"/>
+        </a:ln>
+        <a:ln w="12700" cap="flat" cmpd="sng" algn="ctr">
+          <a:solidFill>
+            <a:schemeClr val="phClr"/>
+          </a:solidFill>
+          <a:prstDash val="solid"/>
+          <a:miter lim="800000"/>
+        </a:ln>
+        <a:ln w="19050" cap="flat" cmpd="sng" algn="ctr">
+          <a:solidFill>
+            <a:schemeClr val="phClr"/>
+          </a:solidFill>
+          <a:prstDash val="solid"/>
+          <a:miter lim="800000"/>
+        </a:ln>
+      </a:lnStyleLst>
+      <a:effectStyleLst>
+        <a:effectStyle>
+          <a:effectLst/>
+        </a:effectStyle>
+        <a:effectStyle>
+          <a:effectLst/>
+        </a:effectStyle>
+        <a:effectStyle>
+          <a:effectLst>
+            <a:outerShdw blurRad="57150" dist="19050" dir="5400000" algn="ctr" rotWithShape="0">
+              <a:srgbClr val="000000">
+                <a:alpha val="63000"/>
+              </a:srgbClr>
+            </a:outerShdw>
+          </a:effectLst>
+        </a:effectStyle>
+      </a:effectStyleLst>
+      <a:bgFillStyleLst>
+        <a:solidFill>
+          <a:schemeClr val="phClr"/>
+        </a:solidFill>
+        <a:solidFill>
+          <a:schemeClr val="phClr">
+            <a:tint val="95000"/>
+            <a:satMod val="170000"/>
+          </a:schemeClr>
+        </a:solidFill>
+        <a:gradFill rotWithShape="1">
+          <a:gsLst>
+            <a:gs pos="0">
+              <a:schemeClr val="phClr">
+                <a:tint val="93000"/>
+                <a:satMod val="150000"/>
+                <a:shade val="98000"/>
+                <a:lumMod val="102000"/>
+              </a:schemeClr>
+            </a:gs>
+            <a:gs pos="50000">
+              <a:schemeClr val="phClr">
+                <a:tint val="98000"/>
+                <a:satMod val="130000"/>
+                <a:shade val="90000"/>
+                <a:lumMod val="103000"/>
+              </a:schemeClr>
+            </a:gs>
+            <a:gs pos="100000">
+              <a:schemeClr val="phClr">
+                <a:shade val="63000"/>
+                <a:satMod val="120000"/>
+              </a:schemeClr>
+            </a:gs>
+          </a:gsLst>
+          <a:lin ang="5400000" scaled="0"/>
+        </a:gradFill>
+      </a:bgFillStyleLst>
+    </a:fmtScheme>
+  </a:themeElements>
+  <a:objectDefaults/>
+  <a:extraClrSchemeLst/>
+  <a:extLst>
+    <a:ext uri="{05A4C25C-085E-4340-85A3-A5531E510DB2}">
+      <thm15:themeFamily xmlns:thm15="http://schemas.microsoft.com/office/thememl/2012/main" name="Office Theme" id="{62F939B6-93AF-4DB8-9C6B-D6C7DFDC589F}" vid="{4A3C46E8-61CC-4603-A589-7422A47A8E4A}"/>
+    </a:ext>
+  </a:extLst>
+</a:theme>
 </file>
</xml_diff>

<commit_message>
Bla pomme de pin
</commit_message>
<xml_diff>
--- a/Presentations/Intermediaire/LFA_Baehler_Schowing_Intermédiaire.pptx
+++ b/Presentations/Intermediaire/LFA_Baehler_Schowing_Intermédiaire.pptx
@@ -526,7 +526,10 @@
             </a:r>
           </a:p>
           <a:p>
-            <a:endParaRPr lang="fr-CH" dirty="0"/>
+            <a:r>
+              <a:rPr lang="fr-CH" dirty="0"/>
+              <a:t>PANDA !!!!!</a:t>
+            </a:r>
           </a:p>
         </p:txBody>
       </p:sp>
@@ -6322,7 +6325,7 @@
           <a:p>
             <a:r>
               <a:rPr lang="fr-CH" dirty="0"/>
-              <a:t>Présentation intermédiaire – L’IMC est-il lié aux taux de stéroïdes naturels dans le corps </a:t>
+              <a:t>Présentation intermédiaire – L’IMC est-il lié aux taux de stéroïdes naturels dans le corps ? </a:t>
             </a:r>
           </a:p>
         </p:txBody>
@@ -6551,19 +6554,21 @@
           <a:p>
             <a:r>
               <a:rPr lang="fr-CH" dirty="0"/>
-              <a:t>Beaucoup de </a:t>
-            </a:r>
-            <a:r>
-              <a:rPr lang="fr-CH" dirty="0" err="1"/>
-              <a:t>preprocessing</a:t>
-            </a:r>
+              <a:t>Beaucoup de prétraitement à faire</a:t>
+            </a:r>
+          </a:p>
+          <a:p>
             <a:r>
               <a:rPr lang="fr-CH" dirty="0"/>
-              <a:t> à faire</a:t>
-            </a:r>
-          </a:p>
-          <a:p>
-            <a:endParaRPr lang="fr-CH" dirty="0"/>
+              <a:t>Si aucune corrélation entre stéroïdes et BMI -&gt; trouver d’autres corrélations</a:t>
+            </a:r>
+          </a:p>
+          <a:p>
+            <a:pPr lvl="1"/>
+            <a:r>
+              <a:rPr lang="fr-CH" dirty="0"/>
+              <a:t>Lien avec la pression systolique ou diastolique par exemple </a:t>
+            </a:r>
           </a:p>
         </p:txBody>
       </p:sp>
@@ -6870,22 +6875,85 @@
             <a:pPr lvl="1"/>
             <a:r>
               <a:rPr lang="fr-CH" dirty="0"/>
-              <a:t>Analyser et comprendre des données</a:t>
+              <a:t>Analyser et comprendre les données et le contexte du projet</a:t>
             </a:r>
           </a:p>
           <a:p>
             <a:pPr lvl="1"/>
             <a:r>
               <a:rPr lang="fr-CH" dirty="0"/>
-              <a:t>Appliquer la logique floue afin de créer un outil de prédiction</a:t>
+              <a:t>Apprivoiser les données</a:t>
+            </a:r>
+          </a:p>
+          <a:p>
+            <a:pPr lvl="1"/>
+            <a:r>
+              <a:rPr lang="fr-CH" dirty="0"/>
+              <a:t>Appliquer les principes de la logique floue dans un cas «expert» </a:t>
+            </a:r>
+          </a:p>
+          <a:p>
+            <a:pPr lvl="1"/>
+            <a:r>
+              <a:rPr lang="fr-CH" dirty="0"/>
+              <a:t>Si possible, créer un outil de prédiction </a:t>
             </a:r>
           </a:p>
           <a:p>
             <a:pPr lvl="1"/>
             <a:endParaRPr lang="fr-CH" dirty="0"/>
           </a:p>
-        </p:txBody>
-      </p:sp>
+          <a:p>
+            <a:pPr lvl="1"/>
+            <a:endParaRPr lang="fr-CH" dirty="0"/>
+          </a:p>
+          <a:p>
+            <a:pPr lvl="1"/>
+            <a:endParaRPr lang="fr-CH" dirty="0"/>
+          </a:p>
+        </p:txBody>
+      </p:sp>
+      <p:pic>
+        <p:nvPicPr>
+          <p:cNvPr id="5" name="Picture 2" descr="Résultat de recherche d'images pour &quot;fuzzy logic&quot;"/>
+          <p:cNvPicPr>
+            <a:picLocks noChangeAspect="1" noChangeArrowheads="1"/>
+          </p:cNvPicPr>
+          <p:nvPr/>
+        </p:nvPicPr>
+        <p:blipFill>
+          <a:blip r:embed="rId2">
+            <a:extLst>
+              <a:ext uri="{28A0092B-C50C-407E-A947-70E740481C1C}">
+                <a14:useLocalDpi xmlns:a14="http://schemas.microsoft.com/office/drawing/2010/main" val="0"/>
+              </a:ext>
+            </a:extLst>
+          </a:blip>
+          <a:srcRect/>
+          <a:stretch>
+            <a:fillRect/>
+          </a:stretch>
+        </p:blipFill>
+        <p:spPr bwMode="auto">
+          <a:xfrm>
+            <a:off x="3188073" y="4807324"/>
+            <a:ext cx="4024473" cy="1636619"/>
+          </a:xfrm>
+          <a:prstGeom prst="rect">
+            <a:avLst/>
+          </a:prstGeom>
+          <a:noFill/>
+          <a:extLst>
+            <a:ext uri="{909E8E84-426E-40DD-AFC4-6F175D3DCCD1}">
+              <a14:hiddenFill xmlns:a14="http://schemas.microsoft.com/office/drawing/2010/main">
+                <a:solidFill>
+                  <a:srgbClr val="FFFFFF"/>
+                </a:solidFill>
+              </a14:hiddenFill>
+            </a:ext>
+          </a:extLst>
+        </p:spPr>
+      </p:pic>
     </p:spTree>
     <p:extLst>
       <p:ext uri="{BB962C8B-B14F-4D97-AF65-F5344CB8AC3E}">
@@ -6948,14 +7016,19 @@
             <p:ph idx="1"/>
           </p:nvPr>
         </p:nvSpPr>
-        <p:spPr/>
+        <p:spPr>
+          <a:xfrm>
+            <a:off x="677334" y="1743730"/>
+            <a:ext cx="8596668" cy="3880773"/>
+          </a:xfrm>
+        </p:spPr>
         <p:txBody>
           <a:bodyPr/>
           <a:lstStyle/>
           <a:p>
             <a:r>
               <a:rPr lang="fr-CH" dirty="0"/>
-              <a:t>Est-il possible de prédire l’IMC à partir des taux de différents stéroïdes présents dans le corps</a:t>
+              <a:t>Est-il possible de prédire l’IMC à partir des taux de différents stéroïdes présents dans le corps ?</a:t>
             </a:r>
           </a:p>
           <a:p>
@@ -6989,13 +7062,18 @@
         </p:blipFill>
         <p:spPr bwMode="auto">
           <a:xfrm>
-            <a:off x="921124" y="3277721"/>
-            <a:ext cx="1279712" cy="1919568"/>
+            <a:off x="622674" y="2986763"/>
+            <a:ext cx="1636431" cy="2454647"/>
           </a:xfrm>
           <a:prstGeom prst="rect">
             <a:avLst/>
           </a:prstGeom>
-          <a:noFill/>
+          <a:ln>
+            <a:noFill/>
+          </a:ln>
+          <a:effectLst>
+            <a:softEdge rad="112500"/>
+          </a:effectLst>
           <a:extLst>
             <a:ext uri="{909E8E84-426E-40DD-AFC4-6F175D3DCCD1}">
               <a14:hiddenFill xmlns:a14="http://schemas.microsoft.com/office/drawing/2010/main">
@@ -7036,7 +7114,12 @@
           <a:prstGeom prst="rect">
             <a:avLst/>
           </a:prstGeom>
-          <a:noFill/>
+          <a:ln>
+            <a:noFill/>
+          </a:ln>
+          <a:effectLst>
+            <a:softEdge rad="112500"/>
+          </a:effectLst>
           <a:extLst>
             <a:ext uri="{909E8E84-426E-40DD-AFC4-6F175D3DCCD1}">
               <a14:hiddenFill xmlns:a14="http://schemas.microsoft.com/office/drawing/2010/main">
@@ -7125,7 +7208,7 @@
           <a:lstStyle/>
           <a:p>
             <a:pPr algn="ctr"/>
-            <a:endParaRPr lang="fr-CH"/>
+            <a:endParaRPr lang="fr-CH" dirty="0"/>
           </a:p>
         </p:txBody>
       </p:sp>
@@ -7136,9 +7219,9 @@
           <p:nvPr/>
         </p:nvSpPr>
         <p:spPr>
-          <a:xfrm rot="19024489">
-            <a:off x="5737643" y="4507729"/>
-            <a:ext cx="1290918" cy="571500"/>
+          <a:xfrm rot="17967391">
+            <a:off x="6065038" y="4663093"/>
+            <a:ext cx="919976" cy="302881"/>
           </a:xfrm>
           <a:prstGeom prst="rightArrow">
             <a:avLst/>
@@ -7165,7 +7248,7 @@
           <a:lstStyle/>
           <a:p>
             <a:pPr algn="ctr"/>
-            <a:endParaRPr lang="fr-CH"/>
+            <a:endParaRPr lang="fr-CH" dirty="0"/>
           </a:p>
         </p:txBody>
       </p:sp>
@@ -7177,7 +7260,7 @@
         </p:nvSpPr>
         <p:spPr>
           <a:xfrm>
-            <a:off x="4407152" y="3108589"/>
+            <a:off x="4632701" y="3367983"/>
             <a:ext cx="712695" cy="1446550"/>
           </a:xfrm>
           <a:prstGeom prst="rect">
@@ -7199,6 +7282,86 @@
               </a:rPr>
               <a:t>?</a:t>
             </a:r>
+          </a:p>
+        </p:txBody>
+      </p:sp>
+      <p:sp>
+        <p:nvSpPr>
+          <p:cNvPr id="11" name="Flèche : droite 10"/>
+          <p:cNvSpPr/>
+          <p:nvPr/>
+        </p:nvSpPr>
+        <p:spPr>
+          <a:xfrm rot="19024489">
+            <a:off x="6217438" y="4815493"/>
+            <a:ext cx="919976" cy="302881"/>
+          </a:xfrm>
+          <a:prstGeom prst="rightArrow">
+            <a:avLst/>
+          </a:prstGeom>
+        </p:spPr>
+        <p:style>
+          <a:lnRef idx="2">
+            <a:schemeClr val="accent1">
+              <a:shade val="50000"/>
+            </a:schemeClr>
+          </a:lnRef>
+          <a:fillRef idx="1">
+            <a:schemeClr val="accent1"/>
+          </a:fillRef>
+          <a:effectRef idx="0">
+            <a:schemeClr val="accent1"/>
+          </a:effectRef>
+          <a:fontRef idx="minor">
+            <a:schemeClr val="lt1"/>
+          </a:fontRef>
+        </p:style>
+        <p:txBody>
+          <a:bodyPr rtlCol="0" anchor="ctr"/>
+          <a:lstStyle/>
+          <a:p>
+            <a:pPr algn="ctr"/>
+            <a:endParaRPr lang="fr-CH" dirty="0"/>
+          </a:p>
+        </p:txBody>
+      </p:sp>
+      <p:sp>
+        <p:nvSpPr>
+          <p:cNvPr id="12" name="Flèche : droite 11"/>
+          <p:cNvSpPr/>
+          <p:nvPr/>
+        </p:nvSpPr>
+        <p:spPr>
+          <a:xfrm rot="20192124">
+            <a:off x="6369838" y="4967893"/>
+            <a:ext cx="919976" cy="302881"/>
+          </a:xfrm>
+          <a:prstGeom prst="rightArrow">
+            <a:avLst/>
+          </a:prstGeom>
+        </p:spPr>
+        <p:style>
+          <a:lnRef idx="2">
+            <a:schemeClr val="accent1">
+              <a:shade val="50000"/>
+            </a:schemeClr>
+          </a:lnRef>
+          <a:fillRef idx="1">
+            <a:schemeClr val="accent1"/>
+          </a:fillRef>
+          <a:effectRef idx="0">
+            <a:schemeClr val="accent1"/>
+          </a:effectRef>
+          <a:fontRef idx="minor">
+            <a:schemeClr val="lt1"/>
+          </a:fontRef>
+        </p:style>
+        <p:txBody>
+          <a:bodyPr rtlCol="0" anchor="ctr"/>
+          <a:lstStyle/>
+          <a:p>
+            <a:pPr algn="ctr"/>
+            <a:endParaRPr lang="fr-CH" dirty="0"/>
           </a:p>
         </p:txBody>
       </p:sp>
@@ -7645,16 +7808,38 @@
           <a:p>
             <a:r>
               <a:rPr lang="fr-CH" dirty="0"/>
-              <a:t>SKIPOGH</a:t>
-            </a:r>
-          </a:p>
-          <a:p>
+              <a:t>SKIPOGH  - </a:t>
+            </a:r>
+            <a:r>
+              <a:rPr lang="en-US" i="1" dirty="0"/>
+              <a:t>Swiss Kidney Project on Genes in Hypertension</a:t>
+            </a:r>
+          </a:p>
+          <a:p>
+            <a:r>
+              <a:rPr lang="en-US" dirty="0"/>
+              <a:t>Étude de la </a:t>
+            </a:r>
+            <a:r>
+              <a:rPr lang="fr-CH" dirty="0"/>
+              <a:t>qualité</a:t>
+            </a:r>
+            <a:r>
+              <a:rPr lang="en-US" dirty="0"/>
+              <a:t> et les conditions de vie et de santé des habitants de Lausanne Genève et Berne. </a:t>
+            </a:r>
             <a:endParaRPr lang="fr-CH" dirty="0"/>
           </a:p>
           <a:p>
             <a:r>
               <a:rPr lang="fr-CH" dirty="0"/>
-              <a:t>Comment sont prélevées les données</a:t>
+              <a:t>Beaucoup de données prélevées</a:t>
+            </a:r>
+          </a:p>
+          <a:p>
+            <a:r>
+              <a:rPr lang="fr-CH" dirty="0"/>
+              <a:t>Pour le projet -&gt; Miction du soir. </a:t>
             </a:r>
           </a:p>
           <a:p>
@@ -7662,6 +7847,47 @@
           </a:p>
         </p:txBody>
       </p:sp>
+      <p:pic>
+        <p:nvPicPr>
+          <p:cNvPr id="2050" name="Picture 2" descr="http://www.skipogh.ch/images/4/4c/Skipogh_logo.png"/>
+          <p:cNvPicPr>
+            <a:picLocks noChangeAspect="1" noChangeArrowheads="1"/>
+          </p:cNvPicPr>
+          <p:nvPr/>
+        </p:nvPicPr>
+        <p:blipFill>
+          <a:blip r:embed="rId2">
+            <a:extLst>
+              <a:ext uri="{28A0092B-C50C-407E-A947-70E740481C1C}">
+                <a14:useLocalDpi xmlns:a14="http://schemas.microsoft.com/office/drawing/2010/main" val="0"/>
+              </a:ext>
+            </a:extLst>
+          </a:blip>
+          <a:srcRect/>
+          <a:stretch>
+            <a:fillRect/>
+          </a:stretch>
+        </p:blipFill>
+        <p:spPr bwMode="auto">
+          <a:xfrm>
+            <a:off x="5693945" y="3454049"/>
+            <a:ext cx="1551893" cy="1474298"/>
+          </a:xfrm>
+          <a:prstGeom prst="rect">
+            <a:avLst/>
+          </a:prstGeom>
+          <a:noFill/>
+          <a:extLst>
+            <a:ext uri="{909E8E84-426E-40DD-AFC4-6F175D3DCCD1}">
+              <a14:hiddenFill xmlns:a14="http://schemas.microsoft.com/office/drawing/2010/main">
+                <a:solidFill>
+                  <a:srgbClr val="FFFFFF"/>
+                </a:solidFill>
+              </a14:hiddenFill>
+            </a:ext>
+          </a:extLst>
+        </p:spPr>
+      </p:pic>
     </p:spTree>
     <p:extLst>
       <p:ext uri="{BB962C8B-B14F-4D97-AF65-F5344CB8AC3E}">
@@ -7726,8 +7952,8 @@
         </p:nvSpPr>
         <p:spPr>
           <a:xfrm>
-            <a:off x="2956610" y="2259106"/>
-            <a:ext cx="8596668" cy="3880773"/>
+            <a:off x="59404" y="1831888"/>
+            <a:ext cx="6921316" cy="3880773"/>
           </a:xfrm>
         </p:spPr>
         <p:txBody>
@@ -7750,7 +7976,7 @@
             <a:pPr lvl="1"/>
             <a:r>
               <a:rPr lang="fr-CH" dirty="0"/>
-              <a:t>Participants et informations diverses (tour de taille, sexe, etc…) </a:t>
+              <a:t>Participants et informations diverses (tour de taille, sexe, pression sanguine etc…) </a:t>
             </a:r>
           </a:p>
         </p:txBody>
@@ -7771,12 +7997,58 @@
         </p:blipFill>
         <p:spPr>
           <a:xfrm>
-            <a:off x="519052" y="2259106"/>
-            <a:ext cx="2293282" cy="4598894"/>
+            <a:off x="6704699" y="1602239"/>
+            <a:ext cx="2620835" cy="5255761"/>
           </a:xfrm>
           <a:prstGeom prst="rect">
             <a:avLst/>
           </a:prstGeom>
+        </p:spPr>
+      </p:pic>
+      <p:pic>
+        <p:nvPicPr>
+          <p:cNvPr id="3076" name="Picture 4" descr="Résultat de recherche d'images pour &quot;oh my god&quot;"/>
+          <p:cNvPicPr>
+            <a:picLocks noChangeAspect="1" noChangeArrowheads="1"/>
+          </p:cNvPicPr>
+          <p:nvPr/>
+        </p:nvPicPr>
+        <p:blipFill>
+          <a:blip r:embed="rId3">
+            <a:extLst>
+              <a:ext uri="{28A0092B-C50C-407E-A947-70E740481C1C}">
+                <a14:useLocalDpi xmlns:a14="http://schemas.microsoft.com/office/drawing/2010/main" val="0"/>
+              </a:ext>
+            </a:extLst>
+          </a:blip>
+          <a:srcRect/>
+          <a:stretch>
+            <a:fillRect/>
+          </a:stretch>
+        </p:blipFill>
+        <p:spPr bwMode="auto">
+          <a:xfrm>
+            <a:off x="4867751" y="5544846"/>
+            <a:ext cx="1836949" cy="1243853"/>
+          </a:xfrm>
+          <a:prstGeom prst="rect">
+            <a:avLst/>
+          </a:prstGeom>
+          <a:ln>
+            <a:noFill/>
+          </a:ln>
+          <a:effectLst>
+            <a:softEdge rad="112500"/>
+          </a:effectLst>
+          <a:extLst>
+            <a:ext uri="{909E8E84-426E-40DD-AFC4-6F175D3DCCD1}">
+              <a14:hiddenFill xmlns:a14="http://schemas.microsoft.com/office/drawing/2010/main">
+                <a:solidFill>
+                  <a:srgbClr val="FFFFFF"/>
+                </a:solidFill>
+              </a14:hiddenFill>
+            </a:ext>
+          </a:extLst>
         </p:spPr>
       </p:pic>
     </p:spTree>

</xml_diff>